<commit_message>
Source Code - modules 4-5
</commit_message>
<xml_diff>
--- a/Slides/4. Creating the Angular Project/creating-the-angular-project-slides.pptx
+++ b/Slides/4. Creating the Angular Project/creating-the-angular-project-slides.pptx
@@ -2032,7 +2032,7 @@
         <p:spPr>
           <a:xfrm>
             <a:off x="7035800" y="3048000"/>
-            <a:ext cx="6150610" cy="3662679"/>
+            <a:ext cx="6150610" cy="3395345"/>
           </a:xfrm>
           <a:prstGeom prst="rect">
             <a:avLst/>
@@ -2095,13 +2095,13 @@
               <a:t> </a:t>
             </a:r>
             <a:r>
-              <a:rPr sz="3200" spc="-35" dirty="0">
-                <a:latin typeface="Verdana" panose="020B0604030504040204"/>
-                <a:cs typeface="Verdana" panose="020B0604030504040204"/>
-              </a:rPr>
-              <a:t>Yarn</a:t>
-            </a:r>
-            <a:endParaRPr sz="3200">
+              <a:rPr lang="en-US" sz="3200" spc="-175" dirty="0">
+                <a:latin typeface="Verdana" panose="020B0604030504040204"/>
+                <a:cs typeface="Verdana" panose="020B0604030504040204"/>
+              </a:rPr>
+              <a:t>NPM</a:t>
+            </a:r>
+            <a:endParaRPr sz="3200" spc="-175" dirty="0">
               <a:latin typeface="Verdana" panose="020B0604030504040204"/>
               <a:cs typeface="Verdana" panose="020B0604030504040204"/>
             </a:endParaRPr>
@@ -2112,23 +2112,9 @@
                 <a:spcPct val="100000"/>
               </a:lnSpc>
               <a:spcBef>
-                <a:spcPts val="2360"/>
+                <a:spcPts val="100"/>
               </a:spcBef>
             </a:pPr>
-            <a:r>
-              <a:rPr sz="3200" spc="-60" dirty="0">
-                <a:latin typeface="Verdana" panose="020B0604030504040204"/>
-                <a:cs typeface="Verdana" panose="020B0604030504040204"/>
-              </a:rPr>
-              <a:t>Install</a:t>
-            </a:r>
-            <a:r>
-              <a:rPr sz="3200" spc="-185" dirty="0">
-                <a:latin typeface="Verdana" panose="020B0604030504040204"/>
-                <a:cs typeface="Verdana" panose="020B0604030504040204"/>
-              </a:rPr>
-              <a:t> </a:t>
-            </a:r>
             <a:r>
               <a:rPr sz="3200" spc="50" dirty="0">
                 <a:latin typeface="Verdana" panose="020B0604030504040204"/>

</xml_diff>